<commit_message>
Statusbericht: Lit-Verzeichnis beschönigt, Tippfehler weg; DB Auswahl begründet, PPT: Notizen ergänzt; MongoQueryKlasse dazu
</commit_message>
<xml_diff>
--- a/Projektplanung/Endabgabedokumente/R&D-Endpraesentation - work in progress.pptx
+++ b/Projektplanung/Endabgabedokumente/R&D-Endpraesentation - work in progress.pptx
@@ -35495,7 +35495,7 @@
           <a:p>
             <a:fld id="{87DE9F5A-30B2-42C4-A747-6425DD4C48A0}" type="datetimeFigureOut">
               <a:rPr lang="de-AT" smtClean="0"/>
-              <a:t>30.08.2017</a:t>
+              <a:t>04.09.2017</a:t>
             </a:fld>
             <a:endParaRPr lang="de-AT"/>
           </a:p>
@@ -35813,6 +35813,107 @@
             </a:r>
           </a:p>
           <a:p>
+            <a:r>
+              <a:rPr lang="de-DE" sz="1200" kern="1200" dirty="0">
+                <a:solidFill>
+                  <a:schemeClr val="tx1"/>
+                </a:solidFill>
+                <a:effectLst/>
+                <a:latin typeface="+mn-lt"/>
+                <a:ea typeface="+mn-ea"/>
+                <a:cs typeface="+mn-cs"/>
+              </a:rPr>
+              <a:t>UK-DALE: </a:t>
+            </a:r>
+            <a:r>
+              <a:rPr lang="de-AT" b="1" dirty="0" err="1"/>
+              <a:t>domestic</a:t>
+            </a:r>
+            <a:r>
+              <a:rPr lang="de-AT" b="1" dirty="0"/>
+              <a:t> </a:t>
+            </a:r>
+            <a:r>
+              <a:rPr lang="de-AT" b="1" dirty="0" err="1"/>
+              <a:t>appliance</a:t>
+            </a:r>
+            <a:r>
+              <a:rPr lang="de-AT" b="1" dirty="0"/>
+              <a:t>-level </a:t>
+            </a:r>
+            <a:r>
+              <a:rPr lang="de-AT" b="1" dirty="0" err="1"/>
+              <a:t>electricity</a:t>
+            </a:r>
+            <a:r>
+              <a:rPr lang="de-AT" b="1" dirty="0"/>
+              <a:t> 5 Homes (3x 16kHz, 2x 1/s) </a:t>
+            </a:r>
+            <a:endParaRPr lang="de-DE" sz="1200" kern="1200" dirty="0">
+              <a:solidFill>
+                <a:schemeClr val="tx1"/>
+              </a:solidFill>
+              <a:effectLst/>
+              <a:latin typeface="+mn-lt"/>
+              <a:ea typeface="+mn-ea"/>
+              <a:cs typeface="+mn-cs"/>
+            </a:endParaRPr>
+          </a:p>
+          <a:p>
+            <a:r>
+              <a:rPr lang="de-DE" sz="1200" kern="1200" dirty="0">
+                <a:solidFill>
+                  <a:schemeClr val="tx1"/>
+                </a:solidFill>
+                <a:effectLst/>
+                <a:latin typeface="+mn-lt"/>
+                <a:ea typeface="+mn-ea"/>
+                <a:cs typeface="+mn-cs"/>
+              </a:rPr>
+              <a:t>ADRES: TU Wien </a:t>
+            </a:r>
+            <a:r>
+              <a:rPr lang="de-AT" dirty="0"/>
+              <a:t>Autonome Dezentrale Regenerative Energie Systeme</a:t>
+            </a:r>
+            <a:r>
+              <a:rPr lang="de-DE" sz="1200" kern="1200" dirty="0">
+                <a:solidFill>
+                  <a:schemeClr val="tx1"/>
+                </a:solidFill>
+                <a:effectLst/>
+                <a:latin typeface="+mn-lt"/>
+                <a:ea typeface="+mn-ea"/>
+                <a:cs typeface="+mn-cs"/>
+              </a:rPr>
+              <a:t>  </a:t>
+            </a:r>
+          </a:p>
+          <a:p>
+            <a:r>
+              <a:rPr lang="de-DE" sz="1200" kern="1200" dirty="0">
+                <a:solidFill>
+                  <a:schemeClr val="tx1"/>
+                </a:solidFill>
+                <a:effectLst/>
+                <a:latin typeface="+mn-lt"/>
+                <a:ea typeface="+mn-ea"/>
+                <a:cs typeface="+mn-cs"/>
+              </a:rPr>
+              <a:t>GREEND: Klagenfurt/</a:t>
+            </a:r>
+            <a:r>
+              <a:rPr lang="de-DE" sz="1200" kern="1200">
+                <a:solidFill>
+                  <a:schemeClr val="tx1"/>
+                </a:solidFill>
+                <a:effectLst/>
+                <a:latin typeface="+mn-lt"/>
+                <a:ea typeface="+mn-ea"/>
+                <a:cs typeface="+mn-cs"/>
+              </a:rPr>
+              <a:t>Udine (Ö/IT)</a:t>
+            </a:r>
             <a:endParaRPr lang="de-AT" dirty="0"/>
           </a:p>
         </p:txBody>
@@ -36539,7 +36640,7 @@
           <a:p>
             <a:fld id="{EB9FC1F5-CF20-491F-8ED3-49AFA3F35A3B}" type="datetimeFigureOut">
               <a:rPr lang="de-AT" smtClean="0"/>
-              <a:t>30.08.2017</a:t>
+              <a:t>04.09.2017</a:t>
             </a:fld>
             <a:endParaRPr lang="de-AT"/>
           </a:p>
@@ -36739,7 +36840,7 @@
           <a:p>
             <a:fld id="{EB9FC1F5-CF20-491F-8ED3-49AFA3F35A3B}" type="datetimeFigureOut">
               <a:rPr lang="de-AT" smtClean="0"/>
-              <a:t>30.08.2017</a:t>
+              <a:t>04.09.2017</a:t>
             </a:fld>
             <a:endParaRPr lang="de-AT"/>
           </a:p>
@@ -36949,7 +37050,7 @@
           <a:p>
             <a:fld id="{EB9FC1F5-CF20-491F-8ED3-49AFA3F35A3B}" type="datetimeFigureOut">
               <a:rPr lang="de-AT" smtClean="0"/>
-              <a:t>30.08.2017</a:t>
+              <a:t>04.09.2017</a:t>
             </a:fld>
             <a:endParaRPr lang="de-AT"/>
           </a:p>
@@ -37149,7 +37250,7 @@
           <a:p>
             <a:fld id="{EB9FC1F5-CF20-491F-8ED3-49AFA3F35A3B}" type="datetimeFigureOut">
               <a:rPr lang="de-AT" smtClean="0"/>
-              <a:t>30.08.2017</a:t>
+              <a:t>04.09.2017</a:t>
             </a:fld>
             <a:endParaRPr lang="de-AT"/>
           </a:p>
@@ -37425,7 +37526,7 @@
           <a:p>
             <a:fld id="{EB9FC1F5-CF20-491F-8ED3-49AFA3F35A3B}" type="datetimeFigureOut">
               <a:rPr lang="de-AT" smtClean="0"/>
-              <a:t>30.08.2017</a:t>
+              <a:t>04.09.2017</a:t>
             </a:fld>
             <a:endParaRPr lang="de-AT"/>
           </a:p>
@@ -37693,7 +37794,7 @@
           <a:p>
             <a:fld id="{EB9FC1F5-CF20-491F-8ED3-49AFA3F35A3B}" type="datetimeFigureOut">
               <a:rPr lang="de-AT" smtClean="0"/>
-              <a:t>30.08.2017</a:t>
+              <a:t>04.09.2017</a:t>
             </a:fld>
             <a:endParaRPr lang="de-AT"/>
           </a:p>
@@ -38108,7 +38209,7 @@
           <a:p>
             <a:fld id="{EB9FC1F5-CF20-491F-8ED3-49AFA3F35A3B}" type="datetimeFigureOut">
               <a:rPr lang="de-AT" smtClean="0"/>
-              <a:t>30.08.2017</a:t>
+              <a:t>04.09.2017</a:t>
             </a:fld>
             <a:endParaRPr lang="de-AT"/>
           </a:p>
@@ -38250,7 +38351,7 @@
           <a:p>
             <a:fld id="{EB9FC1F5-CF20-491F-8ED3-49AFA3F35A3B}" type="datetimeFigureOut">
               <a:rPr lang="de-AT" smtClean="0"/>
-              <a:t>30.08.2017</a:t>
+              <a:t>04.09.2017</a:t>
             </a:fld>
             <a:endParaRPr lang="de-AT"/>
           </a:p>
@@ -38363,7 +38464,7 @@
           <a:p>
             <a:fld id="{EB9FC1F5-CF20-491F-8ED3-49AFA3F35A3B}" type="datetimeFigureOut">
               <a:rPr lang="de-AT" smtClean="0"/>
-              <a:t>30.08.2017</a:t>
+              <a:t>04.09.2017</a:t>
             </a:fld>
             <a:endParaRPr lang="de-AT"/>
           </a:p>
@@ -38676,7 +38777,7 @@
           <a:p>
             <a:fld id="{EB9FC1F5-CF20-491F-8ED3-49AFA3F35A3B}" type="datetimeFigureOut">
               <a:rPr lang="de-AT" smtClean="0"/>
-              <a:t>30.08.2017</a:t>
+              <a:t>04.09.2017</a:t>
             </a:fld>
             <a:endParaRPr lang="de-AT"/>
           </a:p>
@@ -38965,7 +39066,7 @@
           <a:p>
             <a:fld id="{EB9FC1F5-CF20-491F-8ED3-49AFA3F35A3B}" type="datetimeFigureOut">
               <a:rPr lang="de-AT" smtClean="0"/>
-              <a:t>30.08.2017</a:t>
+              <a:t>04.09.2017</a:t>
             </a:fld>
             <a:endParaRPr lang="de-AT"/>
           </a:p>
@@ -39208,7 +39309,7 @@
           <a:p>
             <a:fld id="{EB9FC1F5-CF20-491F-8ED3-49AFA3F35A3B}" type="datetimeFigureOut">
               <a:rPr lang="de-AT" smtClean="0"/>
-              <a:t>30.08.2017</a:t>
+              <a:t>04.09.2017</a:t>
             </a:fld>
             <a:endParaRPr lang="de-AT"/>
           </a:p>

</xml_diff>

<commit_message>
jeweils Showmaster zu den Folien dazu
</commit_message>
<xml_diff>
--- a/Projektplanung/Endabgabedokumente/R&D-Endpraesentation - work in progress.pptx
+++ b/Projektplanung/Endabgabedokumente/R&D-Endpraesentation - work in progress.pptx
@@ -6,10 +6,10 @@
     <p:sldMasterId id="2147483701" r:id="rId2"/>
   </p:sldMasterIdLst>
   <p:notesMasterIdLst>
-    <p:notesMasterId r:id="rId14"/>
+    <p:notesMasterId r:id="rId15"/>
   </p:notesMasterIdLst>
   <p:handoutMasterIdLst>
-    <p:handoutMasterId r:id="rId15"/>
+    <p:handoutMasterId r:id="rId16"/>
   </p:handoutMasterIdLst>
   <p:sldIdLst>
     <p:sldId id="256" r:id="rId3"/>
@@ -18,16 +18,17 @@
     <p:sldId id="264" r:id="rId6"/>
     <p:sldId id="263" r:id="rId7"/>
     <p:sldId id="262" r:id="rId8"/>
-    <p:sldId id="261" r:id="rId9"/>
-    <p:sldId id="260" r:id="rId10"/>
-    <p:sldId id="266" r:id="rId11"/>
-    <p:sldId id="265" r:id="rId12"/>
-    <p:sldId id="258" r:id="rId13"/>
+    <p:sldId id="267" r:id="rId9"/>
+    <p:sldId id="261" r:id="rId10"/>
+    <p:sldId id="260" r:id="rId11"/>
+    <p:sldId id="266" r:id="rId12"/>
+    <p:sldId id="265" r:id="rId13"/>
+    <p:sldId id="258" r:id="rId14"/>
   </p:sldIdLst>
   <p:sldSz cx="9144000" cy="5143500" type="screen16x9"/>
   <p:notesSz cx="6797675" cy="9928225"/>
   <p:custDataLst>
-    <p:tags r:id="rId16"/>
+    <p:tags r:id="rId17"/>
   </p:custDataLst>
   <p:defaultTextStyle>
     <a:defPPr>
@@ -230,6 +231,10 @@
     </p:extLst>
   </p:cmAuthor>
 </p:cmAuthorLst>
+</file>
+
+<file path=ppt/revisionInfo.xml><?xml version="1.0" encoding="utf-8"?>
+<p1510:revInfo xmlns:a="http://schemas.openxmlformats.org/drawingml/2006/main" xmlns:r="http://schemas.openxmlformats.org/officeDocument/2006/relationships" xmlns:p1510="http://schemas.microsoft.com/office/powerpoint/2015/10/main"/>
 </file>
 
 <file path=ppt/charts/chart1.xml><?xml version="1.0" encoding="utf-8"?>
@@ -36107,6 +36112,16 @@
           <a:lstStyle/>
           <a:p>
             <a:r>
+              <a:rPr lang="en-US" dirty="0" err="1"/>
+              <a:t>Showmaster</a:t>
+            </a:r>
+            <a:r>
+              <a:rPr lang="en-US" dirty="0"/>
+              <a:t>: Max</a:t>
+            </a:r>
+          </a:p>
+          <a:p>
+            <a:r>
               <a:rPr lang="en-US" dirty="0"/>
               <a:t>REDD: The Reference Energy Disaggregation Data Set, Version 1.0</a:t>
             </a:r>
@@ -36245,6 +36260,381 @@
 </p:notes>
 </file>
 
+<file path=ppt/notesSlides/notesSlide10.xml><?xml version="1.0" encoding="utf-8"?>
+<p:notes xmlns:a="http://schemas.openxmlformats.org/drawingml/2006/main" xmlns:r="http://schemas.openxmlformats.org/officeDocument/2006/relationships" xmlns:p="http://schemas.openxmlformats.org/presentationml/2006/main">
+  <p:cSld>
+    <p:spTree>
+      <p:nvGrpSpPr>
+        <p:cNvPr id="1" name=""/>
+        <p:cNvGrpSpPr/>
+        <p:nvPr/>
+      </p:nvGrpSpPr>
+      <p:grpSpPr>
+        <a:xfrm>
+          <a:off x="0" y="0"/>
+          <a:ext cx="0" cy="0"/>
+          <a:chOff x="0" y="0"/>
+          <a:chExt cx="0" cy="0"/>
+        </a:xfrm>
+      </p:grpSpPr>
+      <p:sp>
+        <p:nvSpPr>
+          <p:cNvPr id="2" name="Folienbildplatzhalter 1"/>
+          <p:cNvSpPr>
+            <a:spLocks noGrp="1" noRot="1" noChangeAspect="1"/>
+          </p:cNvSpPr>
+          <p:nvPr>
+            <p:ph type="sldImg"/>
+          </p:nvPr>
+        </p:nvSpPr>
+        <p:spPr/>
+      </p:sp>
+      <p:sp>
+        <p:nvSpPr>
+          <p:cNvPr id="3" name="Notizenplatzhalter 2"/>
+          <p:cNvSpPr>
+            <a:spLocks noGrp="1"/>
+          </p:cNvSpPr>
+          <p:nvPr>
+            <p:ph type="body" idx="1"/>
+          </p:nvPr>
+        </p:nvSpPr>
+        <p:spPr/>
+        <p:txBody>
+          <a:bodyPr/>
+          <a:lstStyle/>
+          <a:p>
+            <a:pPr marL="0" marR="0" lvl="0" indent="0" algn="l" defTabSz="914400" rtl="0" eaLnBrk="1" fontAlgn="auto" latinLnBrk="0" hangingPunct="1">
+              <a:lnSpc>
+                <a:spcPct val="100000"/>
+              </a:lnSpc>
+              <a:spcBef>
+                <a:spcPts val="0"/>
+              </a:spcBef>
+              <a:spcAft>
+                <a:spcPts val="0"/>
+              </a:spcAft>
+              <a:buClrTx/>
+              <a:buSzTx/>
+              <a:buFontTx/>
+              <a:buNone/>
+              <a:tabLst/>
+              <a:defRPr/>
+            </a:pPr>
+            <a:r>
+              <a:rPr lang="de-AT" dirty="0"/>
+              <a:t>Showmaster: Max</a:t>
+            </a:r>
+          </a:p>
+          <a:p>
+            <a:pPr marL="0" marR="0" lvl="0" indent="0" algn="l" defTabSz="914400" rtl="0" eaLnBrk="1" fontAlgn="auto" latinLnBrk="0" hangingPunct="1">
+              <a:lnSpc>
+                <a:spcPct val="100000"/>
+              </a:lnSpc>
+              <a:spcBef>
+                <a:spcPts val="0"/>
+              </a:spcBef>
+              <a:spcAft>
+                <a:spcPts val="0"/>
+              </a:spcAft>
+              <a:buClrTx/>
+              <a:buSzTx/>
+              <a:buFontTx/>
+              <a:buNone/>
+              <a:tabLst/>
+              <a:defRPr/>
+            </a:pPr>
+            <a:r>
+              <a:rPr lang="de-AT" dirty="0"/>
+              <a:t>Zweite: zwei Kurven, auf gleich gebracht und gemeinsam dargestellt</a:t>
+            </a:r>
+          </a:p>
+          <a:p>
+            <a:endParaRPr lang="de-AT" dirty="0"/>
+          </a:p>
+          <a:p>
+            <a:endParaRPr lang="de-AT" dirty="0"/>
+          </a:p>
+        </p:txBody>
+      </p:sp>
+      <p:sp>
+        <p:nvSpPr>
+          <p:cNvPr id="4" name="Foliennummernplatzhalter 3"/>
+          <p:cNvSpPr>
+            <a:spLocks noGrp="1"/>
+          </p:cNvSpPr>
+          <p:nvPr>
+            <p:ph type="sldNum" sz="quarter" idx="10"/>
+          </p:nvPr>
+        </p:nvSpPr>
+        <p:spPr/>
+        <p:txBody>
+          <a:bodyPr/>
+          <a:lstStyle/>
+          <a:p>
+            <a:fld id="{50767BAC-B3A7-4D51-A51F-3A021F6FF3ED}" type="slidenum">
+              <a:rPr lang="de-AT" smtClean="0"/>
+              <a:pPr/>
+              <a:t>10</a:t>
+            </a:fld>
+            <a:endParaRPr lang="de-AT" dirty="0"/>
+          </a:p>
+        </p:txBody>
+      </p:sp>
+    </p:spTree>
+    <p:extLst>
+      <p:ext uri="{BB962C8B-B14F-4D97-AF65-F5344CB8AC3E}">
+        <p14:creationId xmlns:p14="http://schemas.microsoft.com/office/powerpoint/2010/main" val="3073094908"/>
+      </p:ext>
+    </p:extLst>
+  </p:cSld>
+  <p:clrMapOvr>
+    <a:masterClrMapping/>
+  </p:clrMapOvr>
+</p:notes>
+</file>
+
+<file path=ppt/notesSlides/notesSlide11.xml><?xml version="1.0" encoding="utf-8"?>
+<p:notes xmlns:a="http://schemas.openxmlformats.org/drawingml/2006/main" xmlns:r="http://schemas.openxmlformats.org/officeDocument/2006/relationships" xmlns:p="http://schemas.openxmlformats.org/presentationml/2006/main">
+  <p:cSld>
+    <p:spTree>
+      <p:nvGrpSpPr>
+        <p:cNvPr id="1" name=""/>
+        <p:cNvGrpSpPr/>
+        <p:nvPr/>
+      </p:nvGrpSpPr>
+      <p:grpSpPr>
+        <a:xfrm>
+          <a:off x="0" y="0"/>
+          <a:ext cx="0" cy="0"/>
+          <a:chOff x="0" y="0"/>
+          <a:chExt cx="0" cy="0"/>
+        </a:xfrm>
+      </p:grpSpPr>
+      <p:sp>
+        <p:nvSpPr>
+          <p:cNvPr id="2" name="Folienbildplatzhalter 1"/>
+          <p:cNvSpPr>
+            <a:spLocks noGrp="1" noRot="1" noChangeAspect="1"/>
+          </p:cNvSpPr>
+          <p:nvPr>
+            <p:ph type="sldImg"/>
+          </p:nvPr>
+        </p:nvSpPr>
+        <p:spPr/>
+      </p:sp>
+      <p:sp>
+        <p:nvSpPr>
+          <p:cNvPr id="3" name="Notizenplatzhalter 2"/>
+          <p:cNvSpPr>
+            <a:spLocks noGrp="1"/>
+          </p:cNvSpPr>
+          <p:nvPr>
+            <p:ph type="body" idx="1"/>
+          </p:nvPr>
+        </p:nvSpPr>
+        <p:spPr/>
+        <p:txBody>
+          <a:bodyPr/>
+          <a:lstStyle/>
+          <a:p>
+            <a:pPr marL="0" marR="0" lvl="0" indent="0" algn="l" defTabSz="914400" rtl="0" eaLnBrk="1" fontAlgn="auto" latinLnBrk="0" hangingPunct="1">
+              <a:lnSpc>
+                <a:spcPct val="100000"/>
+              </a:lnSpc>
+              <a:spcBef>
+                <a:spcPts val="0"/>
+              </a:spcBef>
+              <a:spcAft>
+                <a:spcPts val="0"/>
+              </a:spcAft>
+              <a:buClrTx/>
+              <a:buSzTx/>
+              <a:buFontTx/>
+              <a:buNone/>
+              <a:tabLst/>
+              <a:defRPr/>
+            </a:pPr>
+            <a:r>
+              <a:rPr lang="de-AT" dirty="0"/>
+              <a:t>Showmaster: Max</a:t>
+            </a:r>
+            <a:endParaRPr lang="de-AT" sz="1200" kern="1200" dirty="0">
+              <a:solidFill>
+                <a:schemeClr val="tx1"/>
+              </a:solidFill>
+              <a:latin typeface="Arial" panose="020B0604020202020204" pitchFamily="34" charset="0"/>
+              <a:ea typeface="+mn-ea"/>
+              <a:cs typeface="+mn-cs"/>
+            </a:endParaRPr>
+          </a:p>
+          <a:p>
+            <a:pPr marL="0" marR="0" lvl="0" indent="0" algn="l" defTabSz="914400" rtl="0" eaLnBrk="1" fontAlgn="auto" latinLnBrk="0" hangingPunct="1">
+              <a:lnSpc>
+                <a:spcPct val="100000"/>
+              </a:lnSpc>
+              <a:spcBef>
+                <a:spcPts val="0"/>
+              </a:spcBef>
+              <a:spcAft>
+                <a:spcPts val="0"/>
+              </a:spcAft>
+              <a:buClrTx/>
+              <a:buSzTx/>
+              <a:buFontTx/>
+              <a:buNone/>
+              <a:tabLst/>
+              <a:defRPr/>
+            </a:pPr>
+            <a:r>
+              <a:rPr lang="de-AT" sz="1200" kern="1200" dirty="0">
+                <a:solidFill>
+                  <a:schemeClr val="tx1"/>
+                </a:solidFill>
+                <a:latin typeface="Arial" panose="020B0604020202020204" pitchFamily="34" charset="0"/>
+                <a:ea typeface="+mn-ea"/>
+                <a:cs typeface="+mn-cs"/>
+              </a:rPr>
+              <a:t>REDDhouse_4_channel_14 als Balkendiagramm, um zu zeigen dass es Mittelwerterhaltend ist. </a:t>
+            </a:r>
+            <a:r>
+              <a:rPr lang="de-AT" dirty="0"/>
+              <a:t>drittes: vier Bilder von einer Kurve auf jeweils die Hälfte der Auflösung gebracht</a:t>
+            </a:r>
+          </a:p>
+          <a:p>
+            <a:endParaRPr lang="de-AT" dirty="0"/>
+          </a:p>
+          <a:p>
+            <a:endParaRPr lang="de-AT" dirty="0"/>
+          </a:p>
+        </p:txBody>
+      </p:sp>
+      <p:sp>
+        <p:nvSpPr>
+          <p:cNvPr id="4" name="Foliennummernplatzhalter 3"/>
+          <p:cNvSpPr>
+            <a:spLocks noGrp="1"/>
+          </p:cNvSpPr>
+          <p:nvPr>
+            <p:ph type="sldNum" sz="quarter" idx="10"/>
+          </p:nvPr>
+        </p:nvSpPr>
+        <p:spPr/>
+        <p:txBody>
+          <a:bodyPr/>
+          <a:lstStyle/>
+          <a:p>
+            <a:fld id="{50767BAC-B3A7-4D51-A51F-3A021F6FF3ED}" type="slidenum">
+              <a:rPr lang="de-AT" smtClean="0"/>
+              <a:pPr/>
+              <a:t>11</a:t>
+            </a:fld>
+            <a:endParaRPr lang="de-AT" dirty="0"/>
+          </a:p>
+        </p:txBody>
+      </p:sp>
+    </p:spTree>
+    <p:extLst>
+      <p:ext uri="{BB962C8B-B14F-4D97-AF65-F5344CB8AC3E}">
+        <p14:creationId xmlns:p14="http://schemas.microsoft.com/office/powerpoint/2010/main" val="4049981554"/>
+      </p:ext>
+    </p:extLst>
+  </p:cSld>
+  <p:clrMapOvr>
+    <a:masterClrMapping/>
+  </p:clrMapOvr>
+</p:notes>
+</file>
+
+<file path=ppt/notesSlides/notesSlide12.xml><?xml version="1.0" encoding="utf-8"?>
+<p:notes xmlns:a="http://schemas.openxmlformats.org/drawingml/2006/main" xmlns:r="http://schemas.openxmlformats.org/officeDocument/2006/relationships" xmlns:p="http://schemas.openxmlformats.org/presentationml/2006/main">
+  <p:cSld>
+    <p:spTree>
+      <p:nvGrpSpPr>
+        <p:cNvPr id="1" name=""/>
+        <p:cNvGrpSpPr/>
+        <p:nvPr/>
+      </p:nvGrpSpPr>
+      <p:grpSpPr>
+        <a:xfrm>
+          <a:off x="0" y="0"/>
+          <a:ext cx="0" cy="0"/>
+          <a:chOff x="0" y="0"/>
+          <a:chExt cx="0" cy="0"/>
+        </a:xfrm>
+      </p:grpSpPr>
+      <p:sp>
+        <p:nvSpPr>
+          <p:cNvPr id="2" name="Folienbildplatzhalter 1"/>
+          <p:cNvSpPr>
+            <a:spLocks noGrp="1" noRot="1" noChangeAspect="1"/>
+          </p:cNvSpPr>
+          <p:nvPr>
+            <p:ph type="sldImg"/>
+          </p:nvPr>
+        </p:nvSpPr>
+        <p:spPr/>
+      </p:sp>
+      <p:sp>
+        <p:nvSpPr>
+          <p:cNvPr id="3" name="Notizenplatzhalter 2"/>
+          <p:cNvSpPr>
+            <a:spLocks noGrp="1"/>
+          </p:cNvSpPr>
+          <p:nvPr>
+            <p:ph type="body" idx="1"/>
+          </p:nvPr>
+        </p:nvSpPr>
+        <p:spPr/>
+        <p:txBody>
+          <a:bodyPr/>
+          <a:lstStyle/>
+          <a:p>
+            <a:r>
+              <a:rPr lang="de-AT" dirty="0"/>
+              <a:t>Showmaster: Chris</a:t>
+            </a:r>
+          </a:p>
+        </p:txBody>
+      </p:sp>
+      <p:sp>
+        <p:nvSpPr>
+          <p:cNvPr id="4" name="Foliennummernplatzhalter 3"/>
+          <p:cNvSpPr>
+            <a:spLocks noGrp="1"/>
+          </p:cNvSpPr>
+          <p:nvPr>
+            <p:ph type="sldNum" sz="quarter" idx="10"/>
+          </p:nvPr>
+        </p:nvSpPr>
+        <p:spPr/>
+        <p:txBody>
+          <a:bodyPr/>
+          <a:lstStyle/>
+          <a:p>
+            <a:fld id="{50767BAC-B3A7-4D51-A51F-3A021F6FF3ED}" type="slidenum">
+              <a:rPr lang="de-AT" smtClean="0"/>
+              <a:pPr/>
+              <a:t>12</a:t>
+            </a:fld>
+            <a:endParaRPr lang="de-AT" dirty="0"/>
+          </a:p>
+        </p:txBody>
+      </p:sp>
+    </p:spTree>
+    <p:extLst>
+      <p:ext uri="{BB962C8B-B14F-4D97-AF65-F5344CB8AC3E}">
+        <p14:creationId xmlns:p14="http://schemas.microsoft.com/office/powerpoint/2010/main" val="2961778358"/>
+      </p:ext>
+    </p:extLst>
+  </p:cSld>
+  <p:clrMapOvr>
+    <a:masterClrMapping/>
+  </p:clrMapOvr>
+</p:notes>
+</file>
+
 <file path=ppt/notesSlides/notesSlide2.xml><?xml version="1.0" encoding="utf-8"?>
 <p:notes xmlns:a="http://schemas.openxmlformats.org/drawingml/2006/main" xmlns:r="http://schemas.openxmlformats.org/officeDocument/2006/relationships" xmlns:p="http://schemas.openxmlformats.org/presentationml/2006/main">
   <p:cSld>
@@ -36308,7 +36698,30 @@
             </a:pPr>
             <a:r>
               <a:rPr lang="de-AT" dirty="0"/>
-              <a:t>Auch hier von analog nach digital. </a:t>
+              <a:t>Showmaster: Max</a:t>
+            </a:r>
+          </a:p>
+          <a:p>
+            <a:pPr marL="0" marR="0" lvl="0" indent="0" algn="l" defTabSz="685783" rtl="0" eaLnBrk="1" fontAlgn="auto" latinLnBrk="0" hangingPunct="1">
+              <a:lnSpc>
+                <a:spcPct val="100000"/>
+              </a:lnSpc>
+              <a:spcBef>
+                <a:spcPts val="0"/>
+              </a:spcBef>
+              <a:spcAft>
+                <a:spcPts val="0"/>
+              </a:spcAft>
+              <a:buClrTx/>
+              <a:buSzTx/>
+              <a:buFontTx/>
+              <a:buNone/>
+              <a:tabLst/>
+              <a:defRPr/>
+            </a:pPr>
+            <a:r>
+              <a:rPr lang="de-AT" dirty="0"/>
+              <a:t>auch hier von analog nach digital. </a:t>
             </a:r>
           </a:p>
           <a:p>
@@ -36396,6 +36809,12 @@
         <p:txBody>
           <a:bodyPr/>
           <a:lstStyle/>
+          <a:p>
+            <a:r>
+              <a:rPr lang="de-AT" dirty="0"/>
+              <a:t>Showmaster: Max</a:t>
+            </a:r>
+          </a:p>
           <a:p>
             <a:r>
               <a:rPr lang="de-AT" dirty="0"/>
@@ -36510,7 +36929,13 @@
           <a:p>
             <a:r>
               <a:rPr lang="de-AT" dirty="0"/>
-              <a:t>Die Lösung der großen Datenmengen ist die SmartValAPI, welche es ermöglicht, große Datenmengen benutzerrechtegesteuert anzuzeigen. </a:t>
+              <a:t>Showmaster: Reimar</a:t>
+            </a:r>
+          </a:p>
+          <a:p>
+            <a:r>
+              <a:rPr lang="de-AT" dirty="0"/>
+              <a:t>Die Lösung für der großen Datenmengen ist die SmartValAPI, welche es ermöglicht, große Datenmengen benutzerrechtegesteuert anzuzeigen. </a:t>
             </a:r>
           </a:p>
           <a:p>
@@ -36628,6 +37053,12 @@
         <p:txBody>
           <a:bodyPr/>
           <a:lstStyle/>
+          <a:p>
+            <a:r>
+              <a:rPr lang="de-AT" dirty="0"/>
+              <a:t>Showmaster: Reimar, für LDAP Chris</a:t>
+            </a:r>
+          </a:p>
           <a:p>
             <a:r>
               <a:rPr lang="de-AT" dirty="0"/>
@@ -36756,41 +37187,194 @@
           <a:bodyPr/>
           <a:lstStyle/>
           <a:p>
-            <a:pPr marL="0" marR="0" lvl="0" indent="0" algn="l" defTabSz="914400" rtl="0" eaLnBrk="1" fontAlgn="auto" latinLnBrk="0" hangingPunct="1">
-              <a:lnSpc>
-                <a:spcPct val="100000"/>
-              </a:lnSpc>
-              <a:spcBef>
-                <a:spcPts val="0"/>
-              </a:spcBef>
-              <a:spcAft>
-                <a:spcPts val="0"/>
-              </a:spcAft>
-              <a:buClrTx/>
-              <a:buSzTx/>
-              <a:buFontTx/>
-              <a:buNone/>
-              <a:tabLst/>
-              <a:defRPr/>
-            </a:pPr>
             <a:r>
               <a:rPr lang="de-AT" dirty="0"/>
-              <a:t>erstes: eine Kurve als Liniendiagramm, Daten aus </a:t>
+              <a:t>Showmaster: Chris</a:t>
+            </a:r>
+          </a:p>
+        </p:txBody>
+      </p:sp>
+      <p:sp>
+        <p:nvSpPr>
+          <p:cNvPr id="4" name="Foliennummernplatzhalter 3"/>
+          <p:cNvSpPr>
+            <a:spLocks noGrp="1"/>
+          </p:cNvSpPr>
+          <p:nvPr>
+            <p:ph type="sldNum" sz="quarter" idx="10"/>
+          </p:nvPr>
+        </p:nvSpPr>
+        <p:spPr/>
+        <p:txBody>
+          <a:bodyPr/>
+          <a:lstStyle/>
+          <a:p>
+            <a:fld id="{50767BAC-B3A7-4D51-A51F-3A021F6FF3ED}" type="slidenum">
+              <a:rPr lang="de-AT" smtClean="0"/>
+              <a:pPr/>
+              <a:t>6</a:t>
+            </a:fld>
+            <a:endParaRPr lang="de-AT" dirty="0"/>
+          </a:p>
+        </p:txBody>
+      </p:sp>
+    </p:spTree>
+    <p:extLst>
+      <p:ext uri="{BB962C8B-B14F-4D97-AF65-F5344CB8AC3E}">
+        <p14:creationId xmlns:p14="http://schemas.microsoft.com/office/powerpoint/2010/main" val="3725369276"/>
+      </p:ext>
+    </p:extLst>
+  </p:cSld>
+  <p:clrMapOvr>
+    <a:masterClrMapping/>
+  </p:clrMapOvr>
+</p:notes>
+</file>
+
+<file path=ppt/notesSlides/notesSlide7.xml><?xml version="1.0" encoding="utf-8"?>
+<p:notes xmlns:a="http://schemas.openxmlformats.org/drawingml/2006/main" xmlns:r="http://schemas.openxmlformats.org/officeDocument/2006/relationships" xmlns:p="http://schemas.openxmlformats.org/presentationml/2006/main">
+  <p:cSld>
+    <p:spTree>
+      <p:nvGrpSpPr>
+        <p:cNvPr id="1" name=""/>
+        <p:cNvGrpSpPr/>
+        <p:nvPr/>
+      </p:nvGrpSpPr>
+      <p:grpSpPr>
+        <a:xfrm>
+          <a:off x="0" y="0"/>
+          <a:ext cx="0" cy="0"/>
+          <a:chOff x="0" y="0"/>
+          <a:chExt cx="0" cy="0"/>
+        </a:xfrm>
+      </p:grpSpPr>
+      <p:sp>
+        <p:nvSpPr>
+          <p:cNvPr id="2" name="Folienbildplatzhalter 1"/>
+          <p:cNvSpPr>
+            <a:spLocks noGrp="1" noRot="1" noChangeAspect="1"/>
+          </p:cNvSpPr>
+          <p:nvPr>
+            <p:ph type="sldImg"/>
+          </p:nvPr>
+        </p:nvSpPr>
+        <p:spPr/>
+      </p:sp>
+      <p:sp>
+        <p:nvSpPr>
+          <p:cNvPr id="3" name="Notizenplatzhalter 2"/>
+          <p:cNvSpPr>
+            <a:spLocks noGrp="1"/>
+          </p:cNvSpPr>
+          <p:nvPr>
+            <p:ph type="body" idx="1"/>
+          </p:nvPr>
+        </p:nvSpPr>
+        <p:spPr/>
+        <p:txBody>
+          <a:bodyPr/>
+          <a:lstStyle/>
+          <a:p>
+            <a:r>
+              <a:rPr lang="de-AT" dirty="0"/>
+              <a:t>Showmaster: </a:t>
             </a:r>
             <a:r>
               <a:rPr lang="de-AT" dirty="0" err="1"/>
-              <a:t>test</a:t>
+              <a:t>Chris,Übergang</a:t>
             </a:r>
             <a:r>
               <a:rPr lang="de-AT" dirty="0"/>
-              <a:t> für Diagramme, Tabelle 3</a:t>
+              <a:t>: Max</a:t>
             </a:r>
           </a:p>
+        </p:txBody>
+      </p:sp>
+      <p:sp>
+        <p:nvSpPr>
+          <p:cNvPr id="4" name="Foliennummernplatzhalter 3"/>
+          <p:cNvSpPr>
+            <a:spLocks noGrp="1"/>
+          </p:cNvSpPr>
+          <p:nvPr>
+            <p:ph type="sldNum" sz="quarter" idx="10"/>
+          </p:nvPr>
+        </p:nvSpPr>
+        <p:spPr/>
+        <p:txBody>
+          <a:bodyPr/>
+          <a:lstStyle/>
           <a:p>
+            <a:fld id="{50767BAC-B3A7-4D51-A51F-3A021F6FF3ED}" type="slidenum">
+              <a:rPr lang="de-AT" smtClean="0"/>
+              <a:pPr/>
+              <a:t>7</a:t>
+            </a:fld>
             <a:endParaRPr lang="de-AT" dirty="0"/>
           </a:p>
+        </p:txBody>
+      </p:sp>
+    </p:spTree>
+    <p:extLst>
+      <p:ext uri="{BB962C8B-B14F-4D97-AF65-F5344CB8AC3E}">
+        <p14:creationId xmlns:p14="http://schemas.microsoft.com/office/powerpoint/2010/main" val="2744405686"/>
+      </p:ext>
+    </p:extLst>
+  </p:cSld>
+  <p:clrMapOvr>
+    <a:masterClrMapping/>
+  </p:clrMapOvr>
+</p:notes>
+</file>
+
+<file path=ppt/notesSlides/notesSlide8.xml><?xml version="1.0" encoding="utf-8"?>
+<p:notes xmlns:a="http://schemas.openxmlformats.org/drawingml/2006/main" xmlns:r="http://schemas.openxmlformats.org/officeDocument/2006/relationships" xmlns:p="http://schemas.openxmlformats.org/presentationml/2006/main">
+  <p:cSld>
+    <p:spTree>
+      <p:nvGrpSpPr>
+        <p:cNvPr id="1" name=""/>
+        <p:cNvGrpSpPr/>
+        <p:nvPr/>
+      </p:nvGrpSpPr>
+      <p:grpSpPr>
+        <a:xfrm>
+          <a:off x="0" y="0"/>
+          <a:ext cx="0" cy="0"/>
+          <a:chOff x="0" y="0"/>
+          <a:chExt cx="0" cy="0"/>
+        </a:xfrm>
+      </p:grpSpPr>
+      <p:sp>
+        <p:nvSpPr>
+          <p:cNvPr id="2" name="Folienbildplatzhalter 1"/>
+          <p:cNvSpPr>
+            <a:spLocks noGrp="1" noRot="1" noChangeAspect="1"/>
+          </p:cNvSpPr>
+          <p:nvPr>
+            <p:ph type="sldImg"/>
+          </p:nvPr>
+        </p:nvSpPr>
+        <p:spPr/>
+      </p:sp>
+      <p:sp>
+        <p:nvSpPr>
+          <p:cNvPr id="3" name="Notizenplatzhalter 2"/>
+          <p:cNvSpPr>
+            <a:spLocks noGrp="1"/>
+          </p:cNvSpPr>
+          <p:nvPr>
+            <p:ph type="body" idx="1"/>
+          </p:nvPr>
+        </p:nvSpPr>
+        <p:spPr/>
+        <p:txBody>
+          <a:bodyPr/>
+          <a:lstStyle/>
           <a:p>
-            <a:endParaRPr lang="de-AT" dirty="0"/>
+            <a:r>
+              <a:rPr lang="de-AT" dirty="0"/>
+              <a:t>Showmaster: Max</a:t>
+            </a:r>
           </a:p>
         </p:txBody>
       </p:sp>
@@ -36821,7 +37405,7 @@
     </p:spTree>
     <p:extLst>
       <p:ext uri="{BB962C8B-B14F-4D97-AF65-F5344CB8AC3E}">
-        <p14:creationId xmlns:p14="http://schemas.microsoft.com/office/powerpoint/2010/main" val="1062510730"/>
+        <p14:creationId xmlns:p14="http://schemas.microsoft.com/office/powerpoint/2010/main" val="1300969264"/>
       </p:ext>
     </p:extLst>
   </p:cSld>
@@ -36831,7 +37415,7 @@
 </p:notes>
 </file>
 
-<file path=ppt/notesSlides/notesSlide7.xml><?xml version="1.0" encoding="utf-8"?>
+<file path=ppt/notesSlides/notesSlide9.xml><?xml version="1.0" encoding="utf-8"?>
 <p:notes xmlns:a="http://schemas.openxmlformats.org/drawingml/2006/main" xmlns:r="http://schemas.openxmlformats.org/officeDocument/2006/relationships" xmlns:p="http://schemas.openxmlformats.org/presentationml/2006/main">
   <p:cSld>
     <p:spTree>
@@ -36894,7 +37478,38 @@
             </a:pPr>
             <a:r>
               <a:rPr lang="de-AT" dirty="0"/>
-              <a:t>Zweite: zwei Kurven, auf gleich gebracht und gemeinsam dargestellt</a:t>
+              <a:t>Showmaster: Max</a:t>
+            </a:r>
+          </a:p>
+          <a:p>
+            <a:pPr marL="0" marR="0" lvl="0" indent="0" algn="l" defTabSz="914400" rtl="0" eaLnBrk="1" fontAlgn="auto" latinLnBrk="0" hangingPunct="1">
+              <a:lnSpc>
+                <a:spcPct val="100000"/>
+              </a:lnSpc>
+              <a:spcBef>
+                <a:spcPts val="0"/>
+              </a:spcBef>
+              <a:spcAft>
+                <a:spcPts val="0"/>
+              </a:spcAft>
+              <a:buClrTx/>
+              <a:buSzTx/>
+              <a:buFontTx/>
+              <a:buNone/>
+              <a:tabLst/>
+              <a:defRPr/>
+            </a:pPr>
+            <a:r>
+              <a:rPr lang="de-AT" dirty="0"/>
+              <a:t>erstes: eine Kurve als Liniendiagramm, Daten aus </a:t>
+            </a:r>
+            <a:r>
+              <a:rPr lang="de-AT" dirty="0" err="1"/>
+              <a:t>test</a:t>
+            </a:r>
+            <a:r>
+              <a:rPr lang="de-AT" dirty="0"/>
+              <a:t> für Diagramme, Tabelle 3</a:t>
             </a:r>
           </a:p>
           <a:p>
@@ -36932,214 +37547,7 @@
     </p:spTree>
     <p:extLst>
       <p:ext uri="{BB962C8B-B14F-4D97-AF65-F5344CB8AC3E}">
-        <p14:creationId xmlns:p14="http://schemas.microsoft.com/office/powerpoint/2010/main" val="3073094908"/>
-      </p:ext>
-    </p:extLst>
-  </p:cSld>
-  <p:clrMapOvr>
-    <a:masterClrMapping/>
-  </p:clrMapOvr>
-</p:notes>
-</file>
-
-<file path=ppt/notesSlides/notesSlide8.xml><?xml version="1.0" encoding="utf-8"?>
-<p:notes xmlns:a="http://schemas.openxmlformats.org/drawingml/2006/main" xmlns:r="http://schemas.openxmlformats.org/officeDocument/2006/relationships" xmlns:p="http://schemas.openxmlformats.org/presentationml/2006/main">
-  <p:cSld>
-    <p:spTree>
-      <p:nvGrpSpPr>
-        <p:cNvPr id="1" name=""/>
-        <p:cNvGrpSpPr/>
-        <p:nvPr/>
-      </p:nvGrpSpPr>
-      <p:grpSpPr>
-        <a:xfrm>
-          <a:off x="0" y="0"/>
-          <a:ext cx="0" cy="0"/>
-          <a:chOff x="0" y="0"/>
-          <a:chExt cx="0" cy="0"/>
-        </a:xfrm>
-      </p:grpSpPr>
-      <p:sp>
-        <p:nvSpPr>
-          <p:cNvPr id="2" name="Folienbildplatzhalter 1"/>
-          <p:cNvSpPr>
-            <a:spLocks noGrp="1" noRot="1" noChangeAspect="1"/>
-          </p:cNvSpPr>
-          <p:nvPr>
-            <p:ph type="sldImg"/>
-          </p:nvPr>
-        </p:nvSpPr>
-        <p:spPr/>
-      </p:sp>
-      <p:sp>
-        <p:nvSpPr>
-          <p:cNvPr id="3" name="Notizenplatzhalter 2"/>
-          <p:cNvSpPr>
-            <a:spLocks noGrp="1"/>
-          </p:cNvSpPr>
-          <p:nvPr>
-            <p:ph type="body" idx="1"/>
-          </p:nvPr>
-        </p:nvSpPr>
-        <p:spPr/>
-        <p:txBody>
-          <a:bodyPr/>
-          <a:lstStyle/>
-          <a:p>
-            <a:pPr marL="0" marR="0" lvl="0" indent="0" algn="l" defTabSz="914400" rtl="0" eaLnBrk="1" fontAlgn="auto" latinLnBrk="0" hangingPunct="1">
-              <a:lnSpc>
-                <a:spcPct val="100000"/>
-              </a:lnSpc>
-              <a:spcBef>
-                <a:spcPts val="0"/>
-              </a:spcBef>
-              <a:spcAft>
-                <a:spcPts val="0"/>
-              </a:spcAft>
-              <a:buClrTx/>
-              <a:buSzTx/>
-              <a:buFontTx/>
-              <a:buNone/>
-              <a:tabLst/>
-              <a:defRPr/>
-            </a:pPr>
-            <a:r>
-              <a:rPr lang="de-AT" sz="1200" kern="1200" dirty="0">
-                <a:solidFill>
-                  <a:schemeClr val="tx1"/>
-                </a:solidFill>
-                <a:latin typeface="Arial" panose="020B0604020202020204" pitchFamily="34" charset="0"/>
-                <a:ea typeface="+mn-ea"/>
-                <a:cs typeface="+mn-cs"/>
-              </a:rPr>
-              <a:t>REDDhouse_4_channel_14 als Balkendiagramm, um zu zeigen dass es Mittelwerterhaltend ist. </a:t>
-            </a:r>
-            <a:r>
-              <a:rPr lang="de-AT" dirty="0"/>
-              <a:t>drittes: vier Bilder von einer Kurve auf jeweils die Hälfte der Auflösung gebracht</a:t>
-            </a:r>
-          </a:p>
-          <a:p>
-            <a:endParaRPr lang="de-AT" dirty="0"/>
-          </a:p>
-          <a:p>
-            <a:endParaRPr lang="de-AT" dirty="0"/>
-          </a:p>
-        </p:txBody>
-      </p:sp>
-      <p:sp>
-        <p:nvSpPr>
-          <p:cNvPr id="4" name="Foliennummernplatzhalter 3"/>
-          <p:cNvSpPr>
-            <a:spLocks noGrp="1"/>
-          </p:cNvSpPr>
-          <p:nvPr>
-            <p:ph type="sldNum" sz="quarter" idx="10"/>
-          </p:nvPr>
-        </p:nvSpPr>
-        <p:spPr/>
-        <p:txBody>
-          <a:bodyPr/>
-          <a:lstStyle/>
-          <a:p>
-            <a:fld id="{50767BAC-B3A7-4D51-A51F-3A021F6FF3ED}" type="slidenum">
-              <a:rPr lang="de-AT" smtClean="0"/>
-              <a:pPr/>
-              <a:t>10</a:t>
-            </a:fld>
-            <a:endParaRPr lang="de-AT" dirty="0"/>
-          </a:p>
-        </p:txBody>
-      </p:sp>
-    </p:spTree>
-    <p:extLst>
-      <p:ext uri="{BB962C8B-B14F-4D97-AF65-F5344CB8AC3E}">
-        <p14:creationId xmlns:p14="http://schemas.microsoft.com/office/powerpoint/2010/main" val="4049981554"/>
-      </p:ext>
-    </p:extLst>
-  </p:cSld>
-  <p:clrMapOvr>
-    <a:masterClrMapping/>
-  </p:clrMapOvr>
-</p:notes>
-</file>
-
-<file path=ppt/notesSlides/notesSlide9.xml><?xml version="1.0" encoding="utf-8"?>
-<p:notes xmlns:a="http://schemas.openxmlformats.org/drawingml/2006/main" xmlns:r="http://schemas.openxmlformats.org/officeDocument/2006/relationships" xmlns:p="http://schemas.openxmlformats.org/presentationml/2006/main">
-  <p:cSld>
-    <p:spTree>
-      <p:nvGrpSpPr>
-        <p:cNvPr id="1" name=""/>
-        <p:cNvGrpSpPr/>
-        <p:nvPr/>
-      </p:nvGrpSpPr>
-      <p:grpSpPr>
-        <a:xfrm>
-          <a:off x="0" y="0"/>
-          <a:ext cx="0" cy="0"/>
-          <a:chOff x="0" y="0"/>
-          <a:chExt cx="0" cy="0"/>
-        </a:xfrm>
-      </p:grpSpPr>
-      <p:sp>
-        <p:nvSpPr>
-          <p:cNvPr id="2" name="Folienbildplatzhalter 1"/>
-          <p:cNvSpPr>
-            <a:spLocks noGrp="1" noRot="1" noChangeAspect="1"/>
-          </p:cNvSpPr>
-          <p:nvPr>
-            <p:ph type="sldImg"/>
-          </p:nvPr>
-        </p:nvSpPr>
-        <p:spPr/>
-      </p:sp>
-      <p:sp>
-        <p:nvSpPr>
-          <p:cNvPr id="3" name="Notizenplatzhalter 2"/>
-          <p:cNvSpPr>
-            <a:spLocks noGrp="1"/>
-          </p:cNvSpPr>
-          <p:nvPr>
-            <p:ph type="body" idx="1"/>
-          </p:nvPr>
-        </p:nvSpPr>
-        <p:spPr/>
-        <p:txBody>
-          <a:bodyPr/>
-          <a:lstStyle/>
-          <a:p>
-            <a:endParaRPr lang="de-AT"/>
-          </a:p>
-        </p:txBody>
-      </p:sp>
-      <p:sp>
-        <p:nvSpPr>
-          <p:cNvPr id="4" name="Foliennummernplatzhalter 3"/>
-          <p:cNvSpPr>
-            <a:spLocks noGrp="1"/>
-          </p:cNvSpPr>
-          <p:nvPr>
-            <p:ph type="sldNum" sz="quarter" idx="10"/>
-          </p:nvPr>
-        </p:nvSpPr>
-        <p:spPr/>
-        <p:txBody>
-          <a:bodyPr/>
-          <a:lstStyle/>
-          <a:p>
-            <a:fld id="{50767BAC-B3A7-4D51-A51F-3A021F6FF3ED}" type="slidenum">
-              <a:rPr lang="de-AT" smtClean="0"/>
-              <a:pPr/>
-              <a:t>11</a:t>
-            </a:fld>
-            <a:endParaRPr lang="de-AT" dirty="0"/>
-          </a:p>
-        </p:txBody>
-      </p:sp>
-    </p:spTree>
-    <p:extLst>
-      <p:ext uri="{BB962C8B-B14F-4D97-AF65-F5344CB8AC3E}">
-        <p14:creationId xmlns:p14="http://schemas.microsoft.com/office/powerpoint/2010/main" val="2961778358"/>
+        <p14:creationId xmlns:p14="http://schemas.microsoft.com/office/powerpoint/2010/main" val="1062510730"/>
       </p:ext>
     </p:extLst>
   </p:cSld>
@@ -51530,6 +51938,179 @@
           <p:cNvPr id="2" name="Titel 1">
             <a:extLst>
               <a:ext uri="{FF2B5EF4-FFF2-40B4-BE49-F238E27FC236}">
+                <a16:creationId xmlns:a16="http://schemas.microsoft.com/office/drawing/2014/main" id="{55D28B33-BEFC-467F-B682-7E33D4819E83}"/>
+              </a:ext>
+            </a:extLst>
+          </p:cNvPr>
+          <p:cNvSpPr>
+            <a:spLocks noGrp="1"/>
+          </p:cNvSpPr>
+          <p:nvPr>
+            <p:ph type="title"/>
+          </p:nvPr>
+        </p:nvSpPr>
+        <p:spPr/>
+        <p:txBody>
+          <a:bodyPr/>
+          <a:lstStyle/>
+          <a:p>
+            <a:endParaRPr lang="de-AT"/>
+          </a:p>
+        </p:txBody>
+      </p:sp>
+      <p:sp>
+        <p:nvSpPr>
+          <p:cNvPr id="4" name="Datumsplatzhalter 3">
+            <a:extLst>
+              <a:ext uri="{FF2B5EF4-FFF2-40B4-BE49-F238E27FC236}">
+                <a16:creationId xmlns:a16="http://schemas.microsoft.com/office/drawing/2014/main" id="{864300B9-CC75-43EA-9223-369E61E7F9D8}"/>
+              </a:ext>
+            </a:extLst>
+          </p:cNvPr>
+          <p:cNvSpPr>
+            <a:spLocks noGrp="1"/>
+          </p:cNvSpPr>
+          <p:nvPr>
+            <p:ph type="dt" sz="half" idx="10"/>
+          </p:nvPr>
+        </p:nvSpPr>
+        <p:spPr/>
+        <p:txBody>
+          <a:bodyPr/>
+          <a:lstStyle/>
+          <a:p>
+            <a:fld id="{0DB05EB3-BCF5-4654-8A5F-9CE44BDC604A}" type="datetime1">
+              <a:rPr lang="de-AT" smtClean="0"/>
+              <a:t>11.09.2017</a:t>
+            </a:fld>
+            <a:endParaRPr lang="de-AT" dirty="0"/>
+          </a:p>
+        </p:txBody>
+      </p:sp>
+      <p:sp>
+        <p:nvSpPr>
+          <p:cNvPr id="5" name="Fußzeilenplatzhalter 4">
+            <a:extLst>
+              <a:ext uri="{FF2B5EF4-FFF2-40B4-BE49-F238E27FC236}">
+                <a16:creationId xmlns:a16="http://schemas.microsoft.com/office/drawing/2014/main" id="{645C1D78-BACF-4B5F-8C29-9F6282D6835E}"/>
+              </a:ext>
+            </a:extLst>
+          </p:cNvPr>
+          <p:cNvSpPr>
+            <a:spLocks noGrp="1"/>
+          </p:cNvSpPr>
+          <p:nvPr>
+            <p:ph type="ftr" sz="quarter" idx="11"/>
+          </p:nvPr>
+        </p:nvSpPr>
+        <p:spPr/>
+        <p:txBody>
+          <a:bodyPr/>
+          <a:lstStyle/>
+          <a:p>
+            <a:r>
+              <a:rPr lang="de-AT"/>
+              <a:t>FH Salzburg  ·  Abteilung oder Studiengang  ·  Vorname Nachname </a:t>
+            </a:r>
+            <a:endParaRPr lang="de-AT" dirty="0"/>
+          </a:p>
+        </p:txBody>
+      </p:sp>
+      <p:sp>
+        <p:nvSpPr>
+          <p:cNvPr id="6" name="Foliennummernplatzhalter 5">
+            <a:extLst>
+              <a:ext uri="{FF2B5EF4-FFF2-40B4-BE49-F238E27FC236}">
+                <a16:creationId xmlns:a16="http://schemas.microsoft.com/office/drawing/2014/main" id="{DECC46F1-F08E-4F44-9F80-2796DB1C108D}"/>
+              </a:ext>
+            </a:extLst>
+          </p:cNvPr>
+          <p:cNvSpPr>
+            <a:spLocks noGrp="1"/>
+          </p:cNvSpPr>
+          <p:nvPr>
+            <p:ph type="sldNum" sz="quarter" idx="12"/>
+          </p:nvPr>
+        </p:nvSpPr>
+        <p:spPr/>
+        <p:txBody>
+          <a:bodyPr/>
+          <a:lstStyle/>
+          <a:p>
+            <a:fld id="{E53469B5-C180-4227-8051-48377B8E3CF1}" type="slidenum">
+              <a:rPr lang="de-AT" smtClean="0"/>
+              <a:t>10</a:t>
+            </a:fld>
+            <a:endParaRPr lang="de-AT" dirty="0"/>
+          </a:p>
+        </p:txBody>
+      </p:sp>
+      <p:graphicFrame>
+        <p:nvGraphicFramePr>
+          <p:cNvPr id="7" name="Inhaltsplatzhalter 6">
+            <a:extLst>
+              <a:ext uri="{FF2B5EF4-FFF2-40B4-BE49-F238E27FC236}">
+                <a16:creationId xmlns:a16="http://schemas.microsoft.com/office/drawing/2014/main" id="{631D7EA7-9E9A-4A7E-82D2-97BCEC46033C}"/>
+              </a:ext>
+            </a:extLst>
+          </p:cNvPr>
+          <p:cNvGraphicFramePr>
+            <a:graphicFrameLocks noGrp="1"/>
+          </p:cNvGraphicFramePr>
+          <p:nvPr>
+            <p:ph idx="1"/>
+            <p:extLst>
+              <p:ext uri="{D42A27DB-BD31-4B8C-83A1-F6EECF244321}">
+                <p14:modId xmlns:p14="http://schemas.microsoft.com/office/powerpoint/2010/main" val="2143128329"/>
+              </p:ext>
+            </p:extLst>
+          </p:nvPr>
+        </p:nvGraphicFramePr>
+        <p:xfrm>
+          <a:off x="447675" y="1293091"/>
+          <a:ext cx="7141843" cy="2953472"/>
+        </p:xfrm>
+        <a:graphic>
+          <a:graphicData uri="http://schemas.openxmlformats.org/drawingml/2006/chart">
+            <c:chart xmlns:c="http://schemas.openxmlformats.org/drawingml/2006/chart" xmlns:r="http://schemas.openxmlformats.org/officeDocument/2006/relationships" r:id="rId3"/>
+          </a:graphicData>
+        </a:graphic>
+      </p:graphicFrame>
+    </p:spTree>
+    <p:extLst>
+      <p:ext uri="{BB962C8B-B14F-4D97-AF65-F5344CB8AC3E}">
+        <p14:creationId xmlns:p14="http://schemas.microsoft.com/office/powerpoint/2010/main" val="2478060392"/>
+      </p:ext>
+    </p:extLst>
+  </p:cSld>
+  <p:clrMapOvr>
+    <a:masterClrMapping/>
+  </p:clrMapOvr>
+</p:sld>
+</file>
+
+<file path=ppt/slides/slide11.xml><?xml version="1.0" encoding="utf-8"?>
+<p:sld xmlns:a="http://schemas.openxmlformats.org/drawingml/2006/main" xmlns:r="http://schemas.openxmlformats.org/officeDocument/2006/relationships" xmlns:p="http://schemas.openxmlformats.org/presentationml/2006/main">
+  <p:cSld>
+    <p:spTree>
+      <p:nvGrpSpPr>
+        <p:cNvPr id="1" name=""/>
+        <p:cNvGrpSpPr/>
+        <p:nvPr/>
+      </p:nvGrpSpPr>
+      <p:grpSpPr>
+        <a:xfrm>
+          <a:off x="0" y="0"/>
+          <a:ext cx="0" cy="0"/>
+          <a:chOff x="0" y="0"/>
+          <a:chExt cx="0" cy="0"/>
+        </a:xfrm>
+      </p:grpSpPr>
+      <p:sp>
+        <p:nvSpPr>
+          <p:cNvPr id="2" name="Titel 1">
+            <a:extLst>
+              <a:ext uri="{FF2B5EF4-FFF2-40B4-BE49-F238E27FC236}">
                 <a16:creationId xmlns:a16="http://schemas.microsoft.com/office/drawing/2014/main" id="{D341BABC-768C-4F3D-9063-A53D175D9F19}"/>
               </a:ext>
             </a:extLst>
@@ -51631,7 +52212,7 @@
           <a:p>
             <a:fld id="{E53469B5-C180-4227-8051-48377B8E3CF1}" type="slidenum">
               <a:rPr lang="de-AT" smtClean="0"/>
-              <a:t>10</a:t>
+              <a:t>11</a:t>
             </a:fld>
             <a:endParaRPr lang="de-AT" dirty="0"/>
           </a:p>
@@ -51770,7 +52351,7 @@
 </p:sld>
 </file>
 
-<file path=ppt/slides/slide11.xml><?xml version="1.0" encoding="utf-8"?>
+<file path=ppt/slides/slide12.xml><?xml version="1.0" encoding="utf-8"?>
 <p:sld xmlns:a="http://schemas.openxmlformats.org/drawingml/2006/main" xmlns:r="http://schemas.openxmlformats.org/officeDocument/2006/relationships" xmlns:p="http://schemas.openxmlformats.org/presentationml/2006/main">
   <p:cSld>
     <p:spTree>
@@ -52220,12 +52801,8 @@
           </a:lstStyle>
           <a:p>
             <a:r>
-              <a:rPr lang="de-AT" dirty="0" err="1"/>
-              <a:t>Abschluß</a:t>
-            </a:r>
-            <a:r>
               <a:rPr lang="de-AT" dirty="0"/>
-              <a:t>: 100000 Smartmeter nebeneinander und: wir sind bereits für die Datenflut.</a:t>
+              <a:t>Abschluss: 100000 Smartmeter nebeneinander und: wir sind bereits für die Datenflut.</a:t>
             </a:r>
           </a:p>
           <a:p>
@@ -52290,35 +52867,6 @@
       </p:sp>
       <p:sp>
         <p:nvSpPr>
-          <p:cNvPr id="4" name="Datumsplatzhalter 3">
-            <a:extLst>
-              <a:ext uri="{FF2B5EF4-FFF2-40B4-BE49-F238E27FC236}">
-                <a16:creationId xmlns:a16="http://schemas.microsoft.com/office/drawing/2014/main" id="{44E67E5E-AA61-4259-987C-5338B38B278F}"/>
-              </a:ext>
-            </a:extLst>
-          </p:cNvPr>
-          <p:cNvSpPr>
-            <a:spLocks noGrp="1"/>
-          </p:cNvSpPr>
-          <p:nvPr>
-            <p:ph type="dt" sz="half" idx="10"/>
-          </p:nvPr>
-        </p:nvSpPr>
-        <p:spPr/>
-        <p:txBody>
-          <a:bodyPr/>
-          <a:lstStyle/>
-          <a:p>
-            <a:fld id="{91B2AE6D-FA7A-499C-853F-717509A537E8}" type="datetime1">
-              <a:rPr lang="de-AT" smtClean="0"/>
-              <a:t>11.09.2017</a:t>
-            </a:fld>
-            <a:endParaRPr lang="de-AT" dirty="0"/>
-          </a:p>
-        </p:txBody>
-      </p:sp>
-      <p:sp>
-        <p:nvSpPr>
           <p:cNvPr id="5" name="Fußzeilenplatzhalter 4">
             <a:extLst>
               <a:ext uri="{FF2B5EF4-FFF2-40B4-BE49-F238E27FC236}">
@@ -52338,10 +52886,7 @@
           <a:bodyPr/>
           <a:lstStyle/>
           <a:p>
-            <a:r>
-              <a:rPr lang="de-AT" dirty="0"/>
-              <a:t>FH Salzburg  ·  Abteilung oder Studiengang  ·  Vorname Nachname </a:t>
-            </a:r>
+            <a:endParaRPr lang="de-AT" dirty="0"/>
           </a:p>
         </p:txBody>
       </p:sp>
@@ -52404,8 +52949,8 @@
         </p:blipFill>
         <p:spPr>
           <a:xfrm>
-            <a:off x="5790523" y="1397866"/>
-            <a:ext cx="1798996" cy="2719388"/>
+            <a:off x="2703788" y="-14448"/>
+            <a:ext cx="3413548" cy="5159968"/>
           </a:xfrm>
           <a:prstGeom prst="rect">
             <a:avLst/>
@@ -52543,10 +53088,9 @@
           <a:lstStyle/>
           <a:p>
             <a:r>
-              <a:rPr lang="de-AT"/>
-              <a:t>FH Salzburg  ·  Abteilung oder Studiengang  ·  Vorname Nachname </a:t>
+              <a:rPr lang="de-AT" dirty="0"/>
+              <a:t>FH Salzburg  ·  Informationstechnik &amp; System-Management   ·  Klammer, Unterrainer, Wieland </a:t>
             </a:r>
-            <a:endParaRPr lang="de-AT" dirty="0"/>
           </a:p>
         </p:txBody>
       </p:sp>
@@ -52985,7 +53529,7 @@
             </a:r>
             <a:r>
               <a:rPr lang="de-AT" dirty="0"/>
-              <a:t>? LDAP? </a:t>
+              <a:t>? LDAP? REST?</a:t>
             </a:r>
           </a:p>
           <a:p>
@@ -53162,10 +53706,10 @@
             </a:r>
           </a:p>
           <a:p>
-            <a:r>
-              <a:rPr lang="de-AT" dirty="0"/>
-              <a:t>Beispielaufrufe Benutzerschnittstelle</a:t>
-            </a:r>
+            <a:pPr marL="0" indent="0">
+              <a:buNone/>
+            </a:pPr>
+            <a:endParaRPr lang="de-AT" dirty="0"/>
           </a:p>
           <a:p>
             <a:endParaRPr lang="de-AT" dirty="0"/>
@@ -53294,6 +53838,179 @@
           <p:cNvPr id="2" name="Titel 1">
             <a:extLst>
               <a:ext uri="{FF2B5EF4-FFF2-40B4-BE49-F238E27FC236}">
+                <a16:creationId xmlns:a16="http://schemas.microsoft.com/office/drawing/2014/main" id="{F8A3260B-037C-4380-9902-2FC27E407D16}"/>
+              </a:ext>
+            </a:extLst>
+          </p:cNvPr>
+          <p:cNvSpPr>
+            <a:spLocks noGrp="1"/>
+          </p:cNvSpPr>
+          <p:nvPr>
+            <p:ph type="title"/>
+          </p:nvPr>
+        </p:nvSpPr>
+        <p:spPr/>
+        <p:txBody>
+          <a:bodyPr/>
+          <a:lstStyle/>
+          <a:p>
+            <a:endParaRPr lang="de-AT"/>
+          </a:p>
+        </p:txBody>
+      </p:sp>
+      <p:sp>
+        <p:nvSpPr>
+          <p:cNvPr id="3" name="Inhaltsplatzhalter 2">
+            <a:extLst>
+              <a:ext uri="{FF2B5EF4-FFF2-40B4-BE49-F238E27FC236}">
+                <a16:creationId xmlns:a16="http://schemas.microsoft.com/office/drawing/2014/main" id="{BCC5DB64-ACEE-4666-A660-E14473D15D42}"/>
+              </a:ext>
+            </a:extLst>
+          </p:cNvPr>
+          <p:cNvSpPr>
+            <a:spLocks noGrp="1"/>
+          </p:cNvSpPr>
+          <p:nvPr>
+            <p:ph idx="1"/>
+          </p:nvPr>
+        </p:nvSpPr>
+        <p:spPr/>
+        <p:txBody>
+          <a:bodyPr/>
+          <a:lstStyle/>
+          <a:p>
+            <a:r>
+              <a:rPr lang="de-AT" dirty="0"/>
+              <a:t>Beispielaufrufe Benutzerschnittstelle</a:t>
+            </a:r>
+          </a:p>
+          <a:p>
+            <a:endParaRPr lang="de-AT" dirty="0"/>
+          </a:p>
+        </p:txBody>
+      </p:sp>
+      <p:sp>
+        <p:nvSpPr>
+          <p:cNvPr id="4" name="Datumsplatzhalter 3">
+            <a:extLst>
+              <a:ext uri="{FF2B5EF4-FFF2-40B4-BE49-F238E27FC236}">
+                <a16:creationId xmlns:a16="http://schemas.microsoft.com/office/drawing/2014/main" id="{B0265035-9261-44F6-B65A-096191D11E2A}"/>
+              </a:ext>
+            </a:extLst>
+          </p:cNvPr>
+          <p:cNvSpPr>
+            <a:spLocks noGrp="1"/>
+          </p:cNvSpPr>
+          <p:nvPr>
+            <p:ph type="dt" sz="half" idx="10"/>
+          </p:nvPr>
+        </p:nvSpPr>
+        <p:spPr/>
+        <p:txBody>
+          <a:bodyPr/>
+          <a:lstStyle/>
+          <a:p>
+            <a:fld id="{0DB05EB3-BCF5-4654-8A5F-9CE44BDC604A}" type="datetime1">
+              <a:rPr lang="de-AT" smtClean="0"/>
+              <a:t>11.09.2017</a:t>
+            </a:fld>
+            <a:endParaRPr lang="de-AT" dirty="0"/>
+          </a:p>
+        </p:txBody>
+      </p:sp>
+      <p:sp>
+        <p:nvSpPr>
+          <p:cNvPr id="5" name="Fußzeilenplatzhalter 4">
+            <a:extLst>
+              <a:ext uri="{FF2B5EF4-FFF2-40B4-BE49-F238E27FC236}">
+                <a16:creationId xmlns:a16="http://schemas.microsoft.com/office/drawing/2014/main" id="{4C3A9FDB-8684-471A-B26C-CE65C0CA4934}"/>
+              </a:ext>
+            </a:extLst>
+          </p:cNvPr>
+          <p:cNvSpPr>
+            <a:spLocks noGrp="1"/>
+          </p:cNvSpPr>
+          <p:nvPr>
+            <p:ph type="ftr" sz="quarter" idx="11"/>
+          </p:nvPr>
+        </p:nvSpPr>
+        <p:spPr/>
+        <p:txBody>
+          <a:bodyPr/>
+          <a:lstStyle/>
+          <a:p>
+            <a:r>
+              <a:rPr lang="de-AT"/>
+              <a:t>FH Salzburg  ·  Abteilung oder Studiengang  ·  Vorname Nachname </a:t>
+            </a:r>
+            <a:endParaRPr lang="de-AT" dirty="0"/>
+          </a:p>
+        </p:txBody>
+      </p:sp>
+      <p:sp>
+        <p:nvSpPr>
+          <p:cNvPr id="6" name="Foliennummernplatzhalter 5">
+            <a:extLst>
+              <a:ext uri="{FF2B5EF4-FFF2-40B4-BE49-F238E27FC236}">
+                <a16:creationId xmlns:a16="http://schemas.microsoft.com/office/drawing/2014/main" id="{5F2CD505-E000-4015-992B-B9488361284A}"/>
+              </a:ext>
+            </a:extLst>
+          </p:cNvPr>
+          <p:cNvSpPr>
+            <a:spLocks noGrp="1"/>
+          </p:cNvSpPr>
+          <p:nvPr>
+            <p:ph type="sldNum" sz="quarter" idx="12"/>
+          </p:nvPr>
+        </p:nvSpPr>
+        <p:spPr/>
+        <p:txBody>
+          <a:bodyPr/>
+          <a:lstStyle/>
+          <a:p>
+            <a:fld id="{E53469B5-C180-4227-8051-48377B8E3CF1}" type="slidenum">
+              <a:rPr lang="de-AT" smtClean="0"/>
+              <a:t>7</a:t>
+            </a:fld>
+            <a:endParaRPr lang="de-AT" dirty="0"/>
+          </a:p>
+        </p:txBody>
+      </p:sp>
+    </p:spTree>
+    <p:extLst>
+      <p:ext uri="{BB962C8B-B14F-4D97-AF65-F5344CB8AC3E}">
+        <p14:creationId xmlns:p14="http://schemas.microsoft.com/office/powerpoint/2010/main" val="761423417"/>
+      </p:ext>
+    </p:extLst>
+  </p:cSld>
+  <p:clrMapOvr>
+    <a:masterClrMapping/>
+  </p:clrMapOvr>
+</p:sld>
+</file>
+
+<file path=ppt/slides/slide8.xml><?xml version="1.0" encoding="utf-8"?>
+<p:sld xmlns:a="http://schemas.openxmlformats.org/drawingml/2006/main" xmlns:r="http://schemas.openxmlformats.org/officeDocument/2006/relationships" xmlns:p="http://schemas.openxmlformats.org/presentationml/2006/main">
+  <p:cSld>
+    <p:spTree>
+      <p:nvGrpSpPr>
+        <p:cNvPr id="1" name=""/>
+        <p:cNvGrpSpPr/>
+        <p:nvPr/>
+      </p:nvGrpSpPr>
+      <p:grpSpPr>
+        <a:xfrm>
+          <a:off x="0" y="0"/>
+          <a:ext cx="0" cy="0"/>
+          <a:chOff x="0" y="0"/>
+          <a:chExt cx="0" cy="0"/>
+        </a:xfrm>
+      </p:grpSpPr>
+      <p:sp>
+        <p:nvSpPr>
+          <p:cNvPr id="2" name="Titel 1">
+            <a:extLst>
+              <a:ext uri="{FF2B5EF4-FFF2-40B4-BE49-F238E27FC236}">
                 <a16:creationId xmlns:a16="http://schemas.microsoft.com/office/drawing/2014/main" id="{4AF86614-784F-4AAB-98D2-26B5D73F64C5}"/>
               </a:ext>
             </a:extLst>
@@ -53331,7 +54048,7 @@
           </p:nvPr>
         </p:nvPicPr>
         <p:blipFill>
-          <a:blip r:embed="rId2">
+          <a:blip r:embed="rId3">
             <a:extLst>
               <a:ext uri="{28A0092B-C50C-407E-A947-70E740481C1C}">
                 <a14:useLocalDpi xmlns:a14="http://schemas.microsoft.com/office/drawing/2010/main" val="0"/>
@@ -53430,7 +54147,7 @@
           <a:p>
             <a:fld id="{E53469B5-C180-4227-8051-48377B8E3CF1}" type="slidenum">
               <a:rPr lang="de-AT" smtClean="0"/>
-              <a:t>7</a:t>
+              <a:t>8</a:t>
             </a:fld>
             <a:endParaRPr lang="de-AT" dirty="0"/>
           </a:p>
@@ -53449,7 +54166,7 @@
 </p:sld>
 </file>
 
-<file path=ppt/slides/slide8.xml><?xml version="1.0" encoding="utf-8"?>
+<file path=ppt/slides/slide9.xml><?xml version="1.0" encoding="utf-8"?>
 <p:sld xmlns:a="http://schemas.openxmlformats.org/drawingml/2006/main" xmlns:r="http://schemas.openxmlformats.org/officeDocument/2006/relationships" xmlns:p="http://schemas.openxmlformats.org/presentationml/2006/main">
   <p:cSld>
     <p:spTree>
@@ -53572,7 +54289,7 @@
           <a:p>
             <a:fld id="{E53469B5-C180-4227-8051-48377B8E3CF1}" type="slidenum">
               <a:rPr lang="de-AT" smtClean="0"/>
-              <a:t>8</a:t>
+              <a:t>9</a:t>
             </a:fld>
             <a:endParaRPr lang="de-AT" dirty="0"/>
           </a:p>
@@ -53613,179 +54330,6 @@
     <p:extLst>
       <p:ext uri="{BB962C8B-B14F-4D97-AF65-F5344CB8AC3E}">
         <p14:creationId xmlns:p14="http://schemas.microsoft.com/office/powerpoint/2010/main" val="88476778"/>
-      </p:ext>
-    </p:extLst>
-  </p:cSld>
-  <p:clrMapOvr>
-    <a:masterClrMapping/>
-  </p:clrMapOvr>
-</p:sld>
-</file>
-
-<file path=ppt/slides/slide9.xml><?xml version="1.0" encoding="utf-8"?>
-<p:sld xmlns:a="http://schemas.openxmlformats.org/drawingml/2006/main" xmlns:r="http://schemas.openxmlformats.org/officeDocument/2006/relationships" xmlns:p="http://schemas.openxmlformats.org/presentationml/2006/main">
-  <p:cSld>
-    <p:spTree>
-      <p:nvGrpSpPr>
-        <p:cNvPr id="1" name=""/>
-        <p:cNvGrpSpPr/>
-        <p:nvPr/>
-      </p:nvGrpSpPr>
-      <p:grpSpPr>
-        <a:xfrm>
-          <a:off x="0" y="0"/>
-          <a:ext cx="0" cy="0"/>
-          <a:chOff x="0" y="0"/>
-          <a:chExt cx="0" cy="0"/>
-        </a:xfrm>
-      </p:grpSpPr>
-      <p:sp>
-        <p:nvSpPr>
-          <p:cNvPr id="2" name="Titel 1">
-            <a:extLst>
-              <a:ext uri="{FF2B5EF4-FFF2-40B4-BE49-F238E27FC236}">
-                <a16:creationId xmlns:a16="http://schemas.microsoft.com/office/drawing/2014/main" id="{55D28B33-BEFC-467F-B682-7E33D4819E83}"/>
-              </a:ext>
-            </a:extLst>
-          </p:cNvPr>
-          <p:cNvSpPr>
-            <a:spLocks noGrp="1"/>
-          </p:cNvSpPr>
-          <p:nvPr>
-            <p:ph type="title"/>
-          </p:nvPr>
-        </p:nvSpPr>
-        <p:spPr/>
-        <p:txBody>
-          <a:bodyPr/>
-          <a:lstStyle/>
-          <a:p>
-            <a:endParaRPr lang="de-AT"/>
-          </a:p>
-        </p:txBody>
-      </p:sp>
-      <p:sp>
-        <p:nvSpPr>
-          <p:cNvPr id="4" name="Datumsplatzhalter 3">
-            <a:extLst>
-              <a:ext uri="{FF2B5EF4-FFF2-40B4-BE49-F238E27FC236}">
-                <a16:creationId xmlns:a16="http://schemas.microsoft.com/office/drawing/2014/main" id="{864300B9-CC75-43EA-9223-369E61E7F9D8}"/>
-              </a:ext>
-            </a:extLst>
-          </p:cNvPr>
-          <p:cNvSpPr>
-            <a:spLocks noGrp="1"/>
-          </p:cNvSpPr>
-          <p:nvPr>
-            <p:ph type="dt" sz="half" idx="10"/>
-          </p:nvPr>
-        </p:nvSpPr>
-        <p:spPr/>
-        <p:txBody>
-          <a:bodyPr/>
-          <a:lstStyle/>
-          <a:p>
-            <a:fld id="{0DB05EB3-BCF5-4654-8A5F-9CE44BDC604A}" type="datetime1">
-              <a:rPr lang="de-AT" smtClean="0"/>
-              <a:t>11.09.2017</a:t>
-            </a:fld>
-            <a:endParaRPr lang="de-AT" dirty="0"/>
-          </a:p>
-        </p:txBody>
-      </p:sp>
-      <p:sp>
-        <p:nvSpPr>
-          <p:cNvPr id="5" name="Fußzeilenplatzhalter 4">
-            <a:extLst>
-              <a:ext uri="{FF2B5EF4-FFF2-40B4-BE49-F238E27FC236}">
-                <a16:creationId xmlns:a16="http://schemas.microsoft.com/office/drawing/2014/main" id="{645C1D78-BACF-4B5F-8C29-9F6282D6835E}"/>
-              </a:ext>
-            </a:extLst>
-          </p:cNvPr>
-          <p:cNvSpPr>
-            <a:spLocks noGrp="1"/>
-          </p:cNvSpPr>
-          <p:nvPr>
-            <p:ph type="ftr" sz="quarter" idx="11"/>
-          </p:nvPr>
-        </p:nvSpPr>
-        <p:spPr/>
-        <p:txBody>
-          <a:bodyPr/>
-          <a:lstStyle/>
-          <a:p>
-            <a:r>
-              <a:rPr lang="de-AT"/>
-              <a:t>FH Salzburg  ·  Abteilung oder Studiengang  ·  Vorname Nachname </a:t>
-            </a:r>
-            <a:endParaRPr lang="de-AT" dirty="0"/>
-          </a:p>
-        </p:txBody>
-      </p:sp>
-      <p:sp>
-        <p:nvSpPr>
-          <p:cNvPr id="6" name="Foliennummernplatzhalter 5">
-            <a:extLst>
-              <a:ext uri="{FF2B5EF4-FFF2-40B4-BE49-F238E27FC236}">
-                <a16:creationId xmlns:a16="http://schemas.microsoft.com/office/drawing/2014/main" id="{DECC46F1-F08E-4F44-9F80-2796DB1C108D}"/>
-              </a:ext>
-            </a:extLst>
-          </p:cNvPr>
-          <p:cNvSpPr>
-            <a:spLocks noGrp="1"/>
-          </p:cNvSpPr>
-          <p:nvPr>
-            <p:ph type="sldNum" sz="quarter" idx="12"/>
-          </p:nvPr>
-        </p:nvSpPr>
-        <p:spPr/>
-        <p:txBody>
-          <a:bodyPr/>
-          <a:lstStyle/>
-          <a:p>
-            <a:fld id="{E53469B5-C180-4227-8051-48377B8E3CF1}" type="slidenum">
-              <a:rPr lang="de-AT" smtClean="0"/>
-              <a:t>9</a:t>
-            </a:fld>
-            <a:endParaRPr lang="de-AT" dirty="0"/>
-          </a:p>
-        </p:txBody>
-      </p:sp>
-      <p:graphicFrame>
-        <p:nvGraphicFramePr>
-          <p:cNvPr id="7" name="Inhaltsplatzhalter 6">
-            <a:extLst>
-              <a:ext uri="{FF2B5EF4-FFF2-40B4-BE49-F238E27FC236}">
-                <a16:creationId xmlns:a16="http://schemas.microsoft.com/office/drawing/2014/main" id="{631D7EA7-9E9A-4A7E-82D2-97BCEC46033C}"/>
-              </a:ext>
-            </a:extLst>
-          </p:cNvPr>
-          <p:cNvGraphicFramePr>
-            <a:graphicFrameLocks noGrp="1"/>
-          </p:cNvGraphicFramePr>
-          <p:nvPr>
-            <p:ph idx="1"/>
-            <p:extLst>
-              <p:ext uri="{D42A27DB-BD31-4B8C-83A1-F6EECF244321}">
-                <p14:modId xmlns:p14="http://schemas.microsoft.com/office/powerpoint/2010/main" val="2143128329"/>
-              </p:ext>
-            </p:extLst>
-          </p:nvPr>
-        </p:nvGraphicFramePr>
-        <p:xfrm>
-          <a:off x="447675" y="1293091"/>
-          <a:ext cx="7141843" cy="2953472"/>
-        </p:xfrm>
-        <a:graphic>
-          <a:graphicData uri="http://schemas.openxmlformats.org/drawingml/2006/chart">
-            <c:chart xmlns:c="http://schemas.openxmlformats.org/drawingml/2006/chart" xmlns:r="http://schemas.openxmlformats.org/officeDocument/2006/relationships" r:id="rId3"/>
-          </a:graphicData>
-        </a:graphic>
-      </p:graphicFrame>
-    </p:spTree>
-    <p:extLst>
-      <p:ext uri="{BB962C8B-B14F-4D97-AF65-F5344CB8AC3E}">
-        <p14:creationId xmlns:p14="http://schemas.microsoft.com/office/powerpoint/2010/main" val="2478060392"/>
       </p:ext>
     </p:extLst>
   </p:cSld>

</xml_diff>